<commit_message>
Added lesson four sample
</commit_message>
<xml_diff>
--- a/Lesson/DayTwo (3, 4).pptx
+++ b/Lesson/DayTwo (3, 4).pptx
@@ -8528,21 +8528,15 @@
               <a:rPr lang="en-US" dirty="0">
                 <a:hlinkClick r:id="rId2"/>
               </a:rPr>
-              <a:t>https</a:t>
-            </a:r>
-            <a:r>
-              <a:rPr lang="en-US">
-                <a:hlinkClick r:id="rId2"/>
-              </a:rPr>
-              <a:t>://</a:t>
-            </a:r>
-            <a:r>
-              <a:rPr lang="en-US" smtClean="0">
+              <a:t>https://</a:t>
+            </a:r>
+            <a:r>
+              <a:rPr lang="en-US" dirty="0" smtClean="0">
                 <a:hlinkClick r:id="rId2"/>
               </a:rPr>
               <a:t>docs.microsoft.com/en-us/dotnet/csharp/programming-guide/events/how-to-publish-events-that-conform-to-net-framework-guidelines</a:t>
             </a:r>
-            <a:endParaRPr lang="en-US" smtClean="0"/>
+            <a:endParaRPr lang="en-US" dirty="0" smtClean="0"/>
           </a:p>
           <a:p>
             <a:endParaRPr lang="en-US" dirty="0"/>
@@ -11592,6 +11586,13 @@
   <p:clrMapOvr>
     <a:masterClrMapping/>
   </p:clrMapOvr>
+  <p:timing>
+    <p:tnLst>
+      <p:par>
+        <p:cTn id="1" dur="indefinite" restart="never" nodeType="tmRoot"/>
+      </p:par>
+    </p:tnLst>
+  </p:timing>
 </p:sld>
 </file>
 
@@ -11703,6 +11704,13 @@
   <p:clrMapOvr>
     <a:masterClrMapping/>
   </p:clrMapOvr>
+  <p:timing>
+    <p:tnLst>
+      <p:par>
+        <p:cTn id="1" dur="indefinite" restart="never" nodeType="tmRoot"/>
+      </p:par>
+    </p:tnLst>
+  </p:timing>
 </p:sld>
 </file>
 
@@ -11814,6 +11822,13 @@
   <p:clrMapOvr>
     <a:masterClrMapping/>
   </p:clrMapOvr>
+  <p:timing>
+    <p:tnLst>
+      <p:par>
+        <p:cTn id="1" dur="indefinite" restart="never" nodeType="tmRoot"/>
+      </p:par>
+    </p:tnLst>
+  </p:timing>
 </p:sld>
 </file>
 
@@ -12002,6 +12017,13 @@
   <p:clrMapOvr>
     <a:masterClrMapping/>
   </p:clrMapOvr>
+  <p:timing>
+    <p:tnLst>
+      <p:par>
+        <p:cTn id="1" dur="indefinite" restart="never" nodeType="tmRoot"/>
+      </p:par>
+    </p:tnLst>
+  </p:timing>
 </p:sld>
 </file>
 
@@ -12254,6 +12276,13 @@
   <p:clrMapOvr>
     <a:masterClrMapping/>
   </p:clrMapOvr>
+  <p:timing>
+    <p:tnLst>
+      <p:par>
+        <p:cTn id="1" dur="indefinite" restart="never" nodeType="tmRoot"/>
+      </p:par>
+    </p:tnLst>
+  </p:timing>
 </p:sld>
 </file>
 
@@ -12558,6 +12587,13 @@
   <p:clrMapOvr>
     <a:masterClrMapping/>
   </p:clrMapOvr>
+  <p:timing>
+    <p:tnLst>
+      <p:par>
+        <p:cTn id="1" dur="indefinite" restart="never" nodeType="tmRoot"/>
+      </p:par>
+    </p:tnLst>
+  </p:timing>
 </p:sld>
 </file>
 
@@ -12695,6 +12731,13 @@
   <p:clrMapOvr>
     <a:masterClrMapping/>
   </p:clrMapOvr>
+  <p:timing>
+    <p:tnLst>
+      <p:par>
+        <p:cTn id="1" dur="indefinite" restart="never" nodeType="tmRoot"/>
+      </p:par>
+    </p:tnLst>
+  </p:timing>
 </p:sld>
 </file>
 
@@ -12797,6 +12840,13 @@
   <p:clrMapOvr>
     <a:masterClrMapping/>
   </p:clrMapOvr>
+  <p:timing>
+    <p:tnLst>
+      <p:par>
+        <p:cTn id="1" dur="indefinite" restart="never" nodeType="tmRoot"/>
+      </p:par>
+    </p:tnLst>
+  </p:timing>
 </p:sld>
 </file>
 
@@ -12917,6 +12967,13 @@
   <p:clrMapOvr>
     <a:masterClrMapping/>
   </p:clrMapOvr>
+  <p:timing>
+    <p:tnLst>
+      <p:par>
+        <p:cTn id="1" dur="indefinite" restart="never" nodeType="tmRoot"/>
+      </p:par>
+    </p:tnLst>
+  </p:timing>
 </p:sld>
 </file>
 
@@ -13075,6 +13132,13 @@
   <p:clrMapOvr>
     <a:masterClrMapping/>
   </p:clrMapOvr>
+  <p:timing>
+    <p:tnLst>
+      <p:par>
+        <p:cTn id="1" dur="indefinite" restart="never" nodeType="tmRoot"/>
+      </p:par>
+    </p:tnLst>
+  </p:timing>
 </p:sld>
 </file>
 
@@ -13233,6 +13297,13 @@
   <p:clrMapOvr>
     <a:masterClrMapping/>
   </p:clrMapOvr>
+  <p:timing>
+    <p:tnLst>
+      <p:par>
+        <p:cTn id="1" dur="indefinite" restart="never" nodeType="tmRoot"/>
+      </p:par>
+    </p:tnLst>
+  </p:timing>
 </p:sld>
 </file>
 
@@ -13361,6 +13432,13 @@
   <p:clrMapOvr>
     <a:masterClrMapping/>
   </p:clrMapOvr>
+  <p:timing>
+    <p:tnLst>
+      <p:par>
+        <p:cTn id="1" dur="indefinite" restart="never" nodeType="tmRoot"/>
+      </p:par>
+    </p:tnLst>
+  </p:timing>
 </p:sld>
 </file>
 
@@ -13480,6 +13558,13 @@
   <p:clrMapOvr>
     <a:masterClrMapping/>
   </p:clrMapOvr>
+  <p:timing>
+    <p:tnLst>
+      <p:par>
+        <p:cTn id="1" dur="indefinite" restart="never" nodeType="tmRoot"/>
+      </p:par>
+    </p:tnLst>
+  </p:timing>
 </p:sld>
 </file>
 
@@ -13646,6 +13731,13 @@
   <p:clrMapOvr>
     <a:masterClrMapping/>
   </p:clrMapOvr>
+  <p:timing>
+    <p:tnLst>
+      <p:par>
+        <p:cTn id="1" dur="indefinite" restart="never" nodeType="tmRoot"/>
+      </p:par>
+    </p:tnLst>
+  </p:timing>
 </p:sld>
 </file>
 
@@ -13750,6 +13842,13 @@
   <p:clrMapOvr>
     <a:masterClrMapping/>
   </p:clrMapOvr>
+  <p:timing>
+    <p:tnLst>
+      <p:par>
+        <p:cTn id="1" dur="indefinite" restart="never" nodeType="tmRoot"/>
+      </p:par>
+    </p:tnLst>
+  </p:timing>
 </p:sld>
 </file>
 
@@ -14033,6 +14132,13 @@
   <p:clrMapOvr>
     <a:masterClrMapping/>
   </p:clrMapOvr>
+  <p:timing>
+    <p:tnLst>
+      <p:par>
+        <p:cTn id="1" dur="indefinite" restart="never" nodeType="tmRoot"/>
+      </p:par>
+    </p:tnLst>
+  </p:timing>
 </p:sld>
 </file>
 
@@ -14155,6 +14261,13 @@
   <p:clrMapOvr>
     <a:masterClrMapping/>
   </p:clrMapOvr>
+  <p:timing>
+    <p:tnLst>
+      <p:par>
+        <p:cTn id="1" dur="indefinite" restart="never" nodeType="tmRoot"/>
+      </p:par>
+    </p:tnLst>
+  </p:timing>
 </p:sld>
 </file>
 
@@ -14275,6 +14388,13 @@
   <p:clrMapOvr>
     <a:masterClrMapping/>
   </p:clrMapOvr>
+  <p:timing>
+    <p:tnLst>
+      <p:par>
+        <p:cTn id="1" dur="indefinite" restart="never" nodeType="tmRoot"/>
+      </p:par>
+    </p:tnLst>
+  </p:timing>
 </p:sld>
 </file>
 
@@ -14415,6 +14535,13 @@
   <p:clrMapOvr>
     <a:masterClrMapping/>
   </p:clrMapOvr>
+  <p:timing>
+    <p:tnLst>
+      <p:par>
+        <p:cTn id="1" dur="indefinite" restart="never" nodeType="tmRoot"/>
+      </p:par>
+    </p:tnLst>
+  </p:timing>
 </p:sld>
 </file>
 
@@ -14597,6 +14724,13 @@
   <p:clrMapOvr>
     <a:masterClrMapping/>
   </p:clrMapOvr>
+  <p:timing>
+    <p:tnLst>
+      <p:par>
+        <p:cTn id="1" dur="indefinite" restart="never" nodeType="tmRoot"/>
+      </p:par>
+    </p:tnLst>
+  </p:timing>
 </p:sld>
 </file>
 
@@ -14719,6 +14853,13 @@
   <p:clrMapOvr>
     <a:masterClrMapping/>
   </p:clrMapOvr>
+  <p:timing>
+    <p:tnLst>
+      <p:par>
+        <p:cTn id="1" dur="indefinite" restart="never" nodeType="tmRoot"/>
+      </p:par>
+    </p:tnLst>
+  </p:timing>
 </p:sld>
 </file>
 
@@ -14864,6 +15005,13 @@
   <p:clrMapOvr>
     <a:masterClrMapping/>
   </p:clrMapOvr>
+  <p:timing>
+    <p:tnLst>
+      <p:par>
+        <p:cTn id="1" dur="indefinite" restart="never" nodeType="tmRoot"/>
+      </p:par>
+    </p:tnLst>
+  </p:timing>
 </p:sld>
 </file>
 
@@ -15033,6 +15181,13 @@
   <p:clrMapOvr>
     <a:masterClrMapping/>
   </p:clrMapOvr>
+  <p:timing>
+    <p:tnLst>
+      <p:par>
+        <p:cTn id="1" dur="indefinite" restart="never" nodeType="tmRoot"/>
+      </p:par>
+    </p:tnLst>
+  </p:timing>
 </p:sld>
 </file>
 
@@ -15140,6 +15295,13 @@
   <p:clrMapOvr>
     <a:masterClrMapping/>
   </p:clrMapOvr>
+  <p:timing>
+    <p:tnLst>
+      <p:par>
+        <p:cTn id="1" dur="indefinite" restart="never" nodeType="tmRoot"/>
+      </p:par>
+    </p:tnLst>
+  </p:timing>
 </p:sld>
 </file>
 
@@ -15300,6 +15462,13 @@
   <p:clrMapOvr>
     <a:masterClrMapping/>
   </p:clrMapOvr>
+  <p:timing>
+    <p:tnLst>
+      <p:par>
+        <p:cTn id="1" dur="indefinite" restart="never" nodeType="tmRoot"/>
+      </p:par>
+    </p:tnLst>
+  </p:timing>
 </p:sld>
 </file>
 
@@ -15632,6 +15801,13 @@
   <p:clrMapOvr>
     <a:masterClrMapping/>
   </p:clrMapOvr>
+  <p:timing>
+    <p:tnLst>
+      <p:par>
+        <p:cTn id="1" dur="indefinite" restart="never" nodeType="tmRoot"/>
+      </p:par>
+    </p:tnLst>
+  </p:timing>
 </p:sld>
 </file>
 
@@ -15800,6 +15976,13 @@
   <p:clrMapOvr>
     <a:masterClrMapping/>
   </p:clrMapOvr>
+  <p:timing>
+    <p:tnLst>
+      <p:par>
+        <p:cTn id="1" dur="indefinite" restart="never" nodeType="tmRoot"/>
+      </p:par>
+    </p:tnLst>
+  </p:timing>
 </p:sld>
 </file>
 
@@ -15962,6 +16145,13 @@
   <p:clrMapOvr>
     <a:masterClrMapping/>
   </p:clrMapOvr>
+  <p:timing>
+    <p:tnLst>
+      <p:par>
+        <p:cTn id="1" dur="indefinite" restart="never" nodeType="tmRoot"/>
+      </p:par>
+    </p:tnLst>
+  </p:timing>
 </p:sld>
 </file>
 
@@ -16081,6 +16271,13 @@
   <p:clrMapOvr>
     <a:masterClrMapping/>
   </p:clrMapOvr>
+  <p:timing>
+    <p:tnLst>
+      <p:par>
+        <p:cTn id="1" dur="indefinite" restart="never" nodeType="tmRoot"/>
+      </p:par>
+    </p:tnLst>
+  </p:timing>
 </p:sld>
 </file>
 
@@ -16214,6 +16411,13 @@
   <p:clrMapOvr>
     <a:masterClrMapping/>
   </p:clrMapOvr>
+  <p:timing>
+    <p:tnLst>
+      <p:par>
+        <p:cTn id="1" dur="indefinite" restart="never" nodeType="tmRoot"/>
+      </p:par>
+    </p:tnLst>
+  </p:timing>
 </p:sld>
 </file>
 
@@ -16386,6 +16590,13 @@
   <p:clrMapOvr>
     <a:masterClrMapping/>
   </p:clrMapOvr>
+  <p:timing>
+    <p:tnLst>
+      <p:par>
+        <p:cTn id="1" dur="indefinite" restart="never" nodeType="tmRoot"/>
+      </p:par>
+    </p:tnLst>
+  </p:timing>
 </p:sld>
 </file>
 
@@ -17143,6 +17354,13 @@
   <p:clrMapOvr>
     <a:masterClrMapping/>
   </p:clrMapOvr>
+  <p:timing>
+    <p:tnLst>
+      <p:par>
+        <p:cTn id="1" dur="indefinite" restart="never" nodeType="tmRoot"/>
+      </p:par>
+    </p:tnLst>
+  </p:timing>
 </p:sld>
 </file>
 
@@ -17291,6 +17509,13 @@
   <p:clrMapOvr>
     <a:masterClrMapping/>
   </p:clrMapOvr>
+  <p:timing>
+    <p:tnLst>
+      <p:par>
+        <p:cTn id="1" dur="indefinite" restart="never" nodeType="tmRoot"/>
+      </p:par>
+    </p:tnLst>
+  </p:timing>
 </p:sld>
 </file>
 
@@ -17414,6 +17639,13 @@
   <p:clrMapOvr>
     <a:masterClrMapping/>
   </p:clrMapOvr>
+  <p:timing>
+    <p:tnLst>
+      <p:par>
+        <p:cTn id="1" dur="indefinite" restart="never" nodeType="tmRoot"/>
+      </p:par>
+    </p:tnLst>
+  </p:timing>
 </p:sld>
 </file>
 
@@ -17576,6 +17808,13 @@
   <p:clrMapOvr>
     <a:masterClrMapping/>
   </p:clrMapOvr>
+  <p:timing>
+    <p:tnLst>
+      <p:par>
+        <p:cTn id="1" dur="indefinite" restart="never" nodeType="tmRoot"/>
+      </p:par>
+    </p:tnLst>
+  </p:timing>
 </p:sld>
 </file>
 
@@ -18124,6 +18363,13 @@
   <p:clrMapOvr>
     <a:masterClrMapping/>
   </p:clrMapOvr>
+  <p:timing>
+    <p:tnLst>
+      <p:par>
+        <p:cTn id="1" dur="indefinite" restart="never" nodeType="tmRoot"/>
+      </p:par>
+    </p:tnLst>
+  </p:timing>
 </p:sld>
 </file>
 
@@ -18361,6 +18607,13 @@
   <p:clrMapOvr>
     <a:masterClrMapping/>
   </p:clrMapOvr>
+  <p:timing>
+    <p:tnLst>
+      <p:par>
+        <p:cTn id="1" dur="indefinite" restart="never" nodeType="tmRoot"/>
+      </p:par>
+    </p:tnLst>
+  </p:timing>
 </p:sld>
 </file>
 
@@ -18529,6 +18782,13 @@
   <p:clrMapOvr>
     <a:masterClrMapping/>
   </p:clrMapOvr>
+  <p:timing>
+    <p:tnLst>
+      <p:par>
+        <p:cTn id="1" dur="indefinite" restart="never" nodeType="tmRoot"/>
+      </p:par>
+    </p:tnLst>
+  </p:timing>
 </p:sld>
 </file>
 
@@ -18718,6 +18978,13 @@
   <p:clrMapOvr>
     <a:masterClrMapping/>
   </p:clrMapOvr>
+  <p:timing>
+    <p:tnLst>
+      <p:par>
+        <p:cTn id="1" dur="indefinite" restart="never" nodeType="tmRoot"/>
+      </p:par>
+    </p:tnLst>
+  </p:timing>
 </p:sld>
 </file>
 

</xml_diff>